<commit_message>
update: fix raw ui
</commit_message>
<xml_diff>
--- a/UI Design/Raw UI Design.pptx
+++ b/UI Design/Raw UI Design.pptx
@@ -243,7 +243,7 @@
           <a:lstStyle/>
           <a:p>
             <a:fld id="{8EF2064F-682F-4D4E-A1E5-404B75C7B1DF}" type="datetimeFigureOut">
-              <a:t>19/07/2023</a:t>
+              <a:t>21/07/2023</a:t>
             </a:fld>
             <a:endParaRPr lang="en-VN"/>
           </a:p>
@@ -409,7 +409,7 @@
           <a:lstStyle/>
           <a:p>
             <a:fld id="{8EF2064F-682F-4D4E-A1E5-404B75C7B1DF}" type="datetimeFigureOut">
-              <a:t>19/07/2023</a:t>
+              <a:t>21/07/2023</a:t>
             </a:fld>
             <a:endParaRPr lang="en-VN"/>
           </a:p>
@@ -585,7 +585,7 @@
           <a:lstStyle/>
           <a:p>
             <a:fld id="{8EF2064F-682F-4D4E-A1E5-404B75C7B1DF}" type="datetimeFigureOut">
-              <a:t>19/07/2023</a:t>
+              <a:t>21/07/2023</a:t>
             </a:fld>
             <a:endParaRPr lang="en-VN"/>
           </a:p>
@@ -751,7 +751,7 @@
           <a:lstStyle/>
           <a:p>
             <a:fld id="{8EF2064F-682F-4D4E-A1E5-404B75C7B1DF}" type="datetimeFigureOut">
-              <a:t>19/07/2023</a:t>
+              <a:t>21/07/2023</a:t>
             </a:fld>
             <a:endParaRPr lang="en-VN"/>
           </a:p>
@@ -992,7 +992,7 @@
           <a:lstStyle/>
           <a:p>
             <a:fld id="{8EF2064F-682F-4D4E-A1E5-404B75C7B1DF}" type="datetimeFigureOut">
-              <a:t>19/07/2023</a:t>
+              <a:t>21/07/2023</a:t>
             </a:fld>
             <a:endParaRPr lang="en-VN"/>
           </a:p>
@@ -1219,7 +1219,7 @@
           <a:lstStyle/>
           <a:p>
             <a:fld id="{8EF2064F-682F-4D4E-A1E5-404B75C7B1DF}" type="datetimeFigureOut">
-              <a:t>19/07/2023</a:t>
+              <a:t>21/07/2023</a:t>
             </a:fld>
             <a:endParaRPr lang="en-VN"/>
           </a:p>
@@ -1581,7 +1581,7 @@
           <a:lstStyle/>
           <a:p>
             <a:fld id="{8EF2064F-682F-4D4E-A1E5-404B75C7B1DF}" type="datetimeFigureOut">
-              <a:t>19/07/2023</a:t>
+              <a:t>21/07/2023</a:t>
             </a:fld>
             <a:endParaRPr lang="en-VN"/>
           </a:p>
@@ -1696,7 +1696,7 @@
           <a:lstStyle/>
           <a:p>
             <a:fld id="{8EF2064F-682F-4D4E-A1E5-404B75C7B1DF}" type="datetimeFigureOut">
-              <a:t>19/07/2023</a:t>
+              <a:t>21/07/2023</a:t>
             </a:fld>
             <a:endParaRPr lang="en-VN"/>
           </a:p>
@@ -1789,7 +1789,7 @@
           <a:lstStyle/>
           <a:p>
             <a:fld id="{8EF2064F-682F-4D4E-A1E5-404B75C7B1DF}" type="datetimeFigureOut">
-              <a:t>19/07/2023</a:t>
+              <a:t>21/07/2023</a:t>
             </a:fld>
             <a:endParaRPr lang="en-VN"/>
           </a:p>
@@ -2062,7 +2062,7 @@
           <a:lstStyle/>
           <a:p>
             <a:fld id="{8EF2064F-682F-4D4E-A1E5-404B75C7B1DF}" type="datetimeFigureOut">
-              <a:t>19/07/2023</a:t>
+              <a:t>21/07/2023</a:t>
             </a:fld>
             <a:endParaRPr lang="en-VN"/>
           </a:p>
@@ -2315,7 +2315,7 @@
           <a:lstStyle/>
           <a:p>
             <a:fld id="{8EF2064F-682F-4D4E-A1E5-404B75C7B1DF}" type="datetimeFigureOut">
-              <a:t>19/07/2023</a:t>
+              <a:t>21/07/2023</a:t>
             </a:fld>
             <a:endParaRPr lang="en-VN"/>
           </a:p>
@@ -2524,7 +2524,7 @@
           </a:lstStyle>
           <a:p>
             <a:fld id="{8EF2064F-682F-4D4E-A1E5-404B75C7B1DF}" type="datetimeFigureOut">
-              <a:t>19/07/2023</a:t>
+              <a:t>21/07/2023</a:t>
             </a:fld>
             <a:endParaRPr lang="en-VN"/>
           </a:p>
@@ -4332,10 +4332,10 @@
         </p:sp>
         <p:pic>
           <p:nvPicPr>
-            <p:cNvPr id="10" name="Graphic 9" descr="Add outline">
+            <p:cNvPr id="12" name="Graphic 11" descr="Hamburger Menu Icon outline">
               <a:extLst>
                 <a:ext uri="{FF2B5EF4-FFF2-40B4-BE49-F238E27FC236}">
-                  <a16:creationId xmlns:a16="http://schemas.microsoft.com/office/drawing/2014/main" id="{57C053CB-A773-3E17-6E31-95A7A1E73FC5}"/>
+                  <a16:creationId xmlns:a16="http://schemas.microsoft.com/office/drawing/2014/main" id="{877DB158-19F6-5A53-F323-C50E73E80481}"/>
                 </a:ext>
               </a:extLst>
             </p:cNvPr>
@@ -4349,42 +4349,6 @@
               <a:extLst>
                 <a:ext uri="{96DAC541-7B7A-43D3-8B79-37D633B846F1}">
                   <asvg:svgBlip xmlns:asvg="http://schemas.microsoft.com/office/drawing/2016/SVG/main" r:embed="rId3"/>
-                </a:ext>
-              </a:extLst>
-            </a:blip>
-            <a:stretch>
-              <a:fillRect/>
-            </a:stretch>
-          </p:blipFill>
-          <p:spPr>
-            <a:xfrm>
-              <a:off x="8360228" y="171449"/>
-              <a:ext cx="648000" cy="648000"/>
-            </a:xfrm>
-            <a:prstGeom prst="rect">
-              <a:avLst/>
-            </a:prstGeom>
-          </p:spPr>
-        </p:pic>
-        <p:pic>
-          <p:nvPicPr>
-            <p:cNvPr id="12" name="Graphic 11" descr="Hamburger Menu Icon outline">
-              <a:extLst>
-                <a:ext uri="{FF2B5EF4-FFF2-40B4-BE49-F238E27FC236}">
-                  <a16:creationId xmlns:a16="http://schemas.microsoft.com/office/drawing/2014/main" id="{877DB158-19F6-5A53-F323-C50E73E80481}"/>
-                </a:ext>
-              </a:extLst>
-            </p:cNvPr>
-            <p:cNvPicPr>
-              <a:picLocks noChangeAspect="1"/>
-            </p:cNvPicPr>
-            <p:nvPr/>
-          </p:nvPicPr>
-          <p:blipFill>
-            <a:blip r:embed="rId4">
-              <a:extLst>
-                <a:ext uri="{96DAC541-7B7A-43D3-8B79-37D633B846F1}">
-                  <asvg:svgBlip xmlns:asvg="http://schemas.microsoft.com/office/drawing/2016/SVG/main" r:embed="rId5"/>
                 </a:ext>
               </a:extLst>
             </a:blip>
@@ -4803,10 +4767,10 @@
           <p:nvPr/>
         </p:nvPicPr>
         <p:blipFill>
-          <a:blip r:embed="rId6">
+          <a:blip r:embed="rId4">
             <a:extLst>
               <a:ext uri="{96DAC541-7B7A-43D3-8B79-37D633B846F1}">
-                <asvg:svgBlip xmlns:asvg="http://schemas.microsoft.com/office/drawing/2016/SVG/main" r:embed="rId7"/>
+                <asvg:svgBlip xmlns:asvg="http://schemas.microsoft.com/office/drawing/2016/SVG/main" r:embed="rId5"/>
               </a:ext>
             </a:extLst>
           </a:blip>
@@ -5001,10 +4965,10 @@
           <p:nvPr/>
         </p:nvPicPr>
         <p:blipFill>
-          <a:blip r:embed="rId8">
+          <a:blip r:embed="rId6">
             <a:extLst>
               <a:ext uri="{96DAC541-7B7A-43D3-8B79-37D633B846F1}">
-                <asvg:svgBlip xmlns:asvg="http://schemas.microsoft.com/office/drawing/2016/SVG/main" r:embed="rId9"/>
+                <asvg:svgBlip xmlns:asvg="http://schemas.microsoft.com/office/drawing/2016/SVG/main" r:embed="rId7"/>
               </a:ext>
             </a:extLst>
           </a:blip>
@@ -5037,10 +5001,10 @@
           <p:nvPr/>
         </p:nvPicPr>
         <p:blipFill>
-          <a:blip r:embed="rId10">
+          <a:blip r:embed="rId8">
             <a:extLst>
               <a:ext uri="{96DAC541-7B7A-43D3-8B79-37D633B846F1}">
-                <asvg:svgBlip xmlns:asvg="http://schemas.microsoft.com/office/drawing/2016/SVG/main" r:embed="rId11"/>
+                <asvg:svgBlip xmlns:asvg="http://schemas.microsoft.com/office/drawing/2016/SVG/main" r:embed="rId9"/>
               </a:ext>
             </a:extLst>
           </a:blip>
@@ -5073,10 +5037,10 @@
           <p:nvPr/>
         </p:nvPicPr>
         <p:blipFill>
-          <a:blip r:embed="rId12">
+          <a:blip r:embed="rId10">
             <a:extLst>
               <a:ext uri="{96DAC541-7B7A-43D3-8B79-37D633B846F1}">
-                <asvg:svgBlip xmlns:asvg="http://schemas.microsoft.com/office/drawing/2016/SVG/main" r:embed="rId13"/>
+                <asvg:svgBlip xmlns:asvg="http://schemas.microsoft.com/office/drawing/2016/SVG/main" r:embed="rId11"/>
               </a:ext>
             </a:extLst>
           </a:blip>
@@ -5109,10 +5073,10 @@
           <p:nvPr/>
         </p:nvPicPr>
         <p:blipFill>
-          <a:blip r:embed="rId14">
+          <a:blip r:embed="rId12">
             <a:extLst>
               <a:ext uri="{96DAC541-7B7A-43D3-8B79-37D633B846F1}">
-                <asvg:svgBlip xmlns:asvg="http://schemas.microsoft.com/office/drawing/2016/SVG/main" r:embed="rId15"/>
+                <asvg:svgBlip xmlns:asvg="http://schemas.microsoft.com/office/drawing/2016/SVG/main" r:embed="rId13"/>
               </a:ext>
             </a:extLst>
           </a:blip>
@@ -5124,36 +5088,6 @@
           <a:xfrm>
             <a:off x="7524738" y="10818501"/>
             <a:ext cx="1227371" cy="1227371"/>
-          </a:xfrm>
-          <a:prstGeom prst="rect">
-            <a:avLst/>
-          </a:prstGeom>
-        </p:spPr>
-      </p:pic>
-      <p:pic>
-        <p:nvPicPr>
-          <p:cNvPr id="66" name="Picture 65" descr="A red marker drawn on a grid paper&#10;&#10;Description automatically generated">
-            <a:extLst>
-              <a:ext uri="{FF2B5EF4-FFF2-40B4-BE49-F238E27FC236}">
-                <a16:creationId xmlns:a16="http://schemas.microsoft.com/office/drawing/2014/main" id="{F22EBC00-05DB-58AF-5DD2-6CD476BE0DC2}"/>
-              </a:ext>
-            </a:extLst>
-          </p:cNvPr>
-          <p:cNvPicPr>
-            <a:picLocks noChangeAspect="1"/>
-          </p:cNvPicPr>
-          <p:nvPr/>
-        </p:nvPicPr>
-        <p:blipFill>
-          <a:blip r:embed="rId16"/>
-          <a:stretch>
-            <a:fillRect/>
-          </a:stretch>
-        </p:blipFill>
-        <p:spPr>
-          <a:xfrm>
-            <a:off x="470791" y="4928085"/>
-            <a:ext cx="8207836" cy="5430788"/>
           </a:xfrm>
           <a:prstGeom prst="rect">
             <a:avLst/>
@@ -5203,6 +5137,120 @@
           <a:p>
             <a:pPr algn="ctr"/>
             <a:endParaRPr lang="en-VN"/>
+          </a:p>
+        </p:txBody>
+      </p:sp>
+      <p:pic>
+        <p:nvPicPr>
+          <p:cNvPr id="3" name="Graphic 2" descr="Miscellaneous outline">
+            <a:extLst>
+              <a:ext uri="{FF2B5EF4-FFF2-40B4-BE49-F238E27FC236}">
+                <a16:creationId xmlns:a16="http://schemas.microsoft.com/office/drawing/2014/main" id="{39E6035D-11EC-8F44-0D08-8CDD9EF3B24D}"/>
+              </a:ext>
+            </a:extLst>
+          </p:cNvPr>
+          <p:cNvPicPr>
+            <a:picLocks noChangeAspect="1"/>
+          </p:cNvPicPr>
+          <p:nvPr/>
+        </p:nvPicPr>
+        <p:blipFill>
+          <a:blip r:embed="rId14">
+            <a:extLst>
+              <a:ext uri="{96DAC541-7B7A-43D3-8B79-37D633B846F1}">
+                <asvg:svgBlip xmlns:asvg="http://schemas.microsoft.com/office/drawing/2016/SVG/main" r:embed="rId15"/>
+              </a:ext>
+            </a:extLst>
+          </a:blip>
+          <a:stretch>
+            <a:fillRect/>
+          </a:stretch>
+        </p:blipFill>
+        <p:spPr>
+          <a:xfrm rot="5400000">
+            <a:off x="8318627" y="167015"/>
+            <a:ext cx="720000" cy="720000"/>
+          </a:xfrm>
+          <a:prstGeom prst="rect">
+            <a:avLst/>
+          </a:prstGeom>
+        </p:spPr>
+      </p:pic>
+      <p:pic>
+        <p:nvPicPr>
+          <p:cNvPr id="8" name="Graphic 7" descr="Treasure Map outline">
+            <a:extLst>
+              <a:ext uri="{FF2B5EF4-FFF2-40B4-BE49-F238E27FC236}">
+                <a16:creationId xmlns:a16="http://schemas.microsoft.com/office/drawing/2014/main" id="{A2921066-B661-6E2C-0C57-A2B20F27491F}"/>
+              </a:ext>
+            </a:extLst>
+          </p:cNvPr>
+          <p:cNvPicPr>
+            <a:picLocks noChangeAspect="1"/>
+          </p:cNvPicPr>
+          <p:nvPr/>
+        </p:nvPicPr>
+        <p:blipFill>
+          <a:blip r:embed="rId16">
+            <a:extLst>
+              <a:ext uri="{96DAC541-7B7A-43D3-8B79-37D633B846F1}">
+                <asvg:svgBlip xmlns:asvg="http://schemas.microsoft.com/office/drawing/2016/SVG/main" r:embed="rId17"/>
+              </a:ext>
+            </a:extLst>
+          </a:blip>
+          <a:stretch>
+            <a:fillRect/>
+          </a:stretch>
+        </p:blipFill>
+        <p:spPr>
+          <a:xfrm>
+            <a:off x="2191053" y="4779909"/>
+            <a:ext cx="4784272" cy="4784272"/>
+          </a:xfrm>
+          <a:prstGeom prst="rect">
+            <a:avLst/>
+          </a:prstGeom>
+        </p:spPr>
+      </p:pic>
+      <p:sp>
+        <p:nvSpPr>
+          <p:cNvPr id="9" name="TextBox 8">
+            <a:extLst>
+              <a:ext uri="{FF2B5EF4-FFF2-40B4-BE49-F238E27FC236}">
+                <a16:creationId xmlns:a16="http://schemas.microsoft.com/office/drawing/2014/main" id="{0F189245-B9DF-9DFB-2CC7-63E98A87D091}"/>
+              </a:ext>
+            </a:extLst>
+          </p:cNvPr>
+          <p:cNvSpPr txBox="1"/>
+          <p:nvPr/>
+        </p:nvSpPr>
+        <p:spPr>
+          <a:xfrm>
+            <a:off x="971993" y="9435221"/>
+            <a:ext cx="7200002" cy="646331"/>
+          </a:xfrm>
+          <a:prstGeom prst="rect">
+            <a:avLst/>
+          </a:prstGeom>
+          <a:noFill/>
+        </p:spPr>
+        <p:txBody>
+          <a:bodyPr wrap="square" rtlCol="0">
+            <a:spAutoFit/>
+          </a:bodyPr>
+          <a:lstStyle/>
+          <a:p>
+            <a:pPr algn="ctr"/>
+            <a:r>
+              <a:rPr lang="en-VN" sz="3600">
+                <a:solidFill>
+                  <a:schemeClr val="accent1">
+                    <a:lumMod val="75000"/>
+                  </a:schemeClr>
+                </a:solidFill>
+              </a:rPr>
+              <a:t>Ảnh phác thảo bản đồ 2D</a:t>
+            </a:r>
           </a:p>
         </p:txBody>
       </p:sp>
@@ -5664,36 +5712,6 @@
           </a:p>
         </p:txBody>
       </p:sp>
-      <p:pic>
-        <p:nvPicPr>
-          <p:cNvPr id="16" name="Picture 15" descr="A robot with wheels and wires&#10;&#10;Description automatically generated">
-            <a:extLst>
-              <a:ext uri="{FF2B5EF4-FFF2-40B4-BE49-F238E27FC236}">
-                <a16:creationId xmlns:a16="http://schemas.microsoft.com/office/drawing/2014/main" id="{418EC312-BA96-DCFC-188A-1740F4F63EC4}"/>
-              </a:ext>
-            </a:extLst>
-          </p:cNvPr>
-          <p:cNvPicPr>
-            <a:picLocks noChangeAspect="1"/>
-          </p:cNvPicPr>
-          <p:nvPr/>
-        </p:nvPicPr>
-        <p:blipFill>
-          <a:blip r:embed="rId6"/>
-          <a:stretch>
-            <a:fillRect/>
-          </a:stretch>
-        </p:blipFill>
-        <p:spPr>
-          <a:xfrm>
-            <a:off x="1045693" y="1405945"/>
-            <a:ext cx="7102065" cy="3560724"/>
-          </a:xfrm>
-          <a:prstGeom prst="rect">
-            <a:avLst/>
-          </a:prstGeom>
-        </p:spPr>
-      </p:pic>
       <p:sp>
         <p:nvSpPr>
           <p:cNvPr id="18" name="TextBox 17">
@@ -5832,6 +5850,84 @@
                 </a:solidFill>
               </a:rPr>
               <a:t>inactive</a:t>
+            </a:r>
+          </a:p>
+        </p:txBody>
+      </p:sp>
+      <p:pic>
+        <p:nvPicPr>
+          <p:cNvPr id="3" name="Graphic 2" descr="Robot with solid fill">
+            <a:extLst>
+              <a:ext uri="{FF2B5EF4-FFF2-40B4-BE49-F238E27FC236}">
+                <a16:creationId xmlns:a16="http://schemas.microsoft.com/office/drawing/2014/main" id="{BFC2E14A-E38E-11CC-81DE-4E41B290030F}"/>
+              </a:ext>
+            </a:extLst>
+          </p:cNvPr>
+          <p:cNvPicPr>
+            <a:picLocks noChangeAspect="1"/>
+          </p:cNvPicPr>
+          <p:nvPr/>
+        </p:nvPicPr>
+        <p:blipFill>
+          <a:blip r:embed="rId6">
+            <a:extLst>
+              <a:ext uri="{96DAC541-7B7A-43D3-8B79-37D633B846F1}">
+                <asvg:svgBlip xmlns:asvg="http://schemas.microsoft.com/office/drawing/2016/SVG/main" r:embed="rId7"/>
+              </a:ext>
+            </a:extLst>
+          </a:blip>
+          <a:stretch>
+            <a:fillRect/>
+          </a:stretch>
+        </p:blipFill>
+        <p:spPr>
+          <a:xfrm>
+            <a:off x="3437163" y="1681077"/>
+            <a:ext cx="2269673" cy="2269673"/>
+          </a:xfrm>
+          <a:prstGeom prst="rect">
+            <a:avLst/>
+          </a:prstGeom>
+        </p:spPr>
+      </p:pic>
+      <p:sp>
+        <p:nvSpPr>
+          <p:cNvPr id="6" name="TextBox 5">
+            <a:extLst>
+              <a:ext uri="{FF2B5EF4-FFF2-40B4-BE49-F238E27FC236}">
+                <a16:creationId xmlns:a16="http://schemas.microsoft.com/office/drawing/2014/main" id="{0AD81402-1929-7ED3-006F-377DC0C0D6A0}"/>
+              </a:ext>
+            </a:extLst>
+          </p:cNvPr>
+          <p:cNvSpPr txBox="1"/>
+          <p:nvPr/>
+        </p:nvSpPr>
+        <p:spPr>
+          <a:xfrm>
+            <a:off x="971998" y="4062103"/>
+            <a:ext cx="7200002" cy="646331"/>
+          </a:xfrm>
+          <a:prstGeom prst="rect">
+            <a:avLst/>
+          </a:prstGeom>
+          <a:noFill/>
+        </p:spPr>
+        <p:txBody>
+          <a:bodyPr wrap="square" rtlCol="0">
+            <a:spAutoFit/>
+          </a:bodyPr>
+          <a:lstStyle/>
+          <a:p>
+            <a:pPr algn="ctr"/>
+            <a:r>
+              <a:rPr lang="en-VN" sz="3600">
+                <a:solidFill>
+                  <a:schemeClr val="accent1">
+                    <a:lumMod val="75000"/>
+                  </a:schemeClr>
+                </a:solidFill>
+              </a:rPr>
+              <a:t>Ảnh chụp thiết bị</a:t>
             </a:r>
           </a:p>
         </p:txBody>

</xml_diff>